<commit_message>
docs, add DRDS overview
</commit_message>
<xml_diff>
--- a/docs/source.pptx
+++ b/docs/source.pptx
@@ -201,7 +201,7 @@
           <a:p>
             <a:fld id="{F2AFE6A1-2F39-4B01-97AE-169630C5A3E5}" type="datetimeFigureOut">
               <a:rPr lang="zh-CN" altLang="en-US" smtClean="0"/>
-              <a:t>2019-12-17</a:t>
+              <a:t>2019-12-19</a:t>
             </a:fld>
             <a:endParaRPr lang="zh-CN" altLang="en-US"/>
           </a:p>
@@ -681,7 +681,7 @@
           <a:p>
             <a:fld id="{1371499B-6999-409F-9FD6-0E57C3931DBB}" type="datetimeFigureOut">
               <a:rPr lang="zh-CN" altLang="en-US" smtClean="0"/>
-              <a:t>2019-12-17</a:t>
+              <a:t>2019-12-19</a:t>
             </a:fld>
             <a:endParaRPr lang="zh-CN" altLang="en-US"/>
           </a:p>
@@ -849,7 +849,7 @@
           <a:p>
             <a:fld id="{1371499B-6999-409F-9FD6-0E57C3931DBB}" type="datetimeFigureOut">
               <a:rPr lang="zh-CN" altLang="en-US" smtClean="0"/>
-              <a:t>2019-12-17</a:t>
+              <a:t>2019-12-19</a:t>
             </a:fld>
             <a:endParaRPr lang="zh-CN" altLang="en-US"/>
           </a:p>
@@ -1027,7 +1027,7 @@
           <a:p>
             <a:fld id="{1371499B-6999-409F-9FD6-0E57C3931DBB}" type="datetimeFigureOut">
               <a:rPr lang="zh-CN" altLang="en-US" smtClean="0"/>
-              <a:t>2019-12-17</a:t>
+              <a:t>2019-12-19</a:t>
             </a:fld>
             <a:endParaRPr lang="zh-CN" altLang="en-US"/>
           </a:p>
@@ -1195,7 +1195,7 @@
           <a:p>
             <a:fld id="{1371499B-6999-409F-9FD6-0E57C3931DBB}" type="datetimeFigureOut">
               <a:rPr lang="zh-CN" altLang="en-US" smtClean="0"/>
-              <a:t>2019-12-17</a:t>
+              <a:t>2019-12-19</a:t>
             </a:fld>
             <a:endParaRPr lang="zh-CN" altLang="en-US"/>
           </a:p>
@@ -1440,7 +1440,7 @@
           <a:p>
             <a:fld id="{1371499B-6999-409F-9FD6-0E57C3931DBB}" type="datetimeFigureOut">
               <a:rPr lang="zh-CN" altLang="en-US" smtClean="0"/>
-              <a:t>2019-12-17</a:t>
+              <a:t>2019-12-19</a:t>
             </a:fld>
             <a:endParaRPr lang="zh-CN" altLang="en-US"/>
           </a:p>
@@ -1669,7 +1669,7 @@
           <a:p>
             <a:fld id="{1371499B-6999-409F-9FD6-0E57C3931DBB}" type="datetimeFigureOut">
               <a:rPr lang="zh-CN" altLang="en-US" smtClean="0"/>
-              <a:t>2019-12-17</a:t>
+              <a:t>2019-12-19</a:t>
             </a:fld>
             <a:endParaRPr lang="zh-CN" altLang="en-US"/>
           </a:p>
@@ -2033,7 +2033,7 @@
           <a:p>
             <a:fld id="{1371499B-6999-409F-9FD6-0E57C3931DBB}" type="datetimeFigureOut">
               <a:rPr lang="zh-CN" altLang="en-US" smtClean="0"/>
-              <a:t>2019-12-17</a:t>
+              <a:t>2019-12-19</a:t>
             </a:fld>
             <a:endParaRPr lang="zh-CN" altLang="en-US"/>
           </a:p>
@@ -2150,7 +2150,7 @@
           <a:p>
             <a:fld id="{1371499B-6999-409F-9FD6-0E57C3931DBB}" type="datetimeFigureOut">
               <a:rPr lang="zh-CN" altLang="en-US" smtClean="0"/>
-              <a:t>2019-12-17</a:t>
+              <a:t>2019-12-19</a:t>
             </a:fld>
             <a:endParaRPr lang="zh-CN" altLang="en-US"/>
           </a:p>
@@ -2245,7 +2245,7 @@
           <a:p>
             <a:fld id="{1371499B-6999-409F-9FD6-0E57C3931DBB}" type="datetimeFigureOut">
               <a:rPr lang="zh-CN" altLang="en-US" smtClean="0"/>
-              <a:t>2019-12-17</a:t>
+              <a:t>2019-12-19</a:t>
             </a:fld>
             <a:endParaRPr lang="zh-CN" altLang="en-US"/>
           </a:p>
@@ -2520,7 +2520,7 @@
           <a:p>
             <a:fld id="{1371499B-6999-409F-9FD6-0E57C3931DBB}" type="datetimeFigureOut">
               <a:rPr lang="zh-CN" altLang="en-US" smtClean="0"/>
-              <a:t>2019-12-17</a:t>
+              <a:t>2019-12-19</a:t>
             </a:fld>
             <a:endParaRPr lang="zh-CN" altLang="en-US"/>
           </a:p>
@@ -2772,7 +2772,7 @@
           <a:p>
             <a:fld id="{1371499B-6999-409F-9FD6-0E57C3931DBB}" type="datetimeFigureOut">
               <a:rPr lang="zh-CN" altLang="en-US" smtClean="0"/>
-              <a:t>2019-12-17</a:t>
+              <a:t>2019-12-19</a:t>
             </a:fld>
             <a:endParaRPr lang="zh-CN" altLang="en-US"/>
           </a:p>
@@ -2983,7 +2983,7 @@
           <a:p>
             <a:fld id="{1371499B-6999-409F-9FD6-0E57C3931DBB}" type="datetimeFigureOut">
               <a:rPr lang="zh-CN" altLang="en-US" smtClean="0"/>
-              <a:t>2019-12-17</a:t>
+              <a:t>2019-12-19</a:t>
             </a:fld>
             <a:endParaRPr lang="zh-CN" altLang="en-US"/>
           </a:p>
@@ -4616,8 +4616,25 @@
                 <a:latin typeface="微软雅黑" panose="020B0503020204020204" pitchFamily="34" charset="-122"/>
                 <a:ea typeface="微软雅黑" panose="020B0503020204020204" pitchFamily="34" charset="-122"/>
               </a:rPr>
-              <a:t>MyCat</a:t>
-            </a:r>
+              <a:t>MyCat/Sharding</a:t>
+            </a:r>
+            <a:r>
+              <a:rPr lang="en-US" altLang="zh-CN" sz="1000" b="1" dirty="0">
+                <a:solidFill>
+                  <a:schemeClr val="tx1"/>
+                </a:solidFill>
+                <a:latin typeface="微软雅黑" panose="020B0503020204020204" pitchFamily="34" charset="-122"/>
+                <a:ea typeface="微软雅黑" panose="020B0503020204020204" pitchFamily="34" charset="-122"/>
+              </a:rPr>
+              <a:t>-Proxy</a:t>
+            </a:r>
+            <a:endParaRPr lang="en-US" sz="1000" b="1" dirty="0">
+              <a:solidFill>
+                <a:schemeClr val="tx1"/>
+              </a:solidFill>
+              <a:latin typeface="微软雅黑" panose="020B0503020204020204" pitchFamily="34" charset="-122"/>
+              <a:ea typeface="微软雅黑" panose="020B0503020204020204" pitchFamily="34" charset="-122"/>
+            </a:endParaRPr>
           </a:p>
         </p:txBody>
       </p:sp>

</xml_diff>